<commit_message>
- Added finished version of the plaque in the "Presentation" directory. - Small changes made to PowerPoint presentation
</commit_message>
<xml_diff>
--- a/Presentation/NanomousePowerpointPresentation.pptx
+++ b/Presentation/NanomousePowerpointPresentation.pptx
@@ -309,7 +309,7 @@
           <a:p>
             <a:fld id="{4AAD347D-5ACD-4C99-B74B-A9C85AD731AF}" type="datetimeFigureOut">
               <a:rPr lang="en-US" dirty="0"/>
-              <a:t>4/2/2015</a:t>
+              <a:t>4/12/2015</a:t>
             </a:fld>
             <a:endParaRPr lang="en-US" dirty="0"/>
           </a:p>
@@ -579,7 +579,7 @@
           <a:p>
             <a:fld id="{4509A250-FF31-4206-8172-F9D3106AACB1}" type="datetimeFigureOut">
               <a:rPr lang="en-US" dirty="0"/>
-              <a:t>4/2/2015</a:t>
+              <a:t>4/12/2015</a:t>
             </a:fld>
             <a:endParaRPr lang="en-US" dirty="0"/>
           </a:p>
@@ -768,7 +768,7 @@
           <a:p>
             <a:fld id="{4509A250-FF31-4206-8172-F9D3106AACB1}" type="datetimeFigureOut">
               <a:rPr lang="en-US" dirty="0"/>
-              <a:t>4/2/2015</a:t>
+              <a:t>4/12/2015</a:t>
             </a:fld>
             <a:endParaRPr lang="en-US" dirty="0"/>
           </a:p>
@@ -1036,7 +1036,7 @@
           <a:p>
             <a:fld id="{4509A250-FF31-4206-8172-F9D3106AACB1}" type="datetimeFigureOut">
               <a:rPr lang="en-US" dirty="0"/>
-              <a:t>4/2/2015</a:t>
+              <a:t>4/12/2015</a:t>
             </a:fld>
             <a:endParaRPr lang="en-US" dirty="0"/>
           </a:p>
@@ -1372,7 +1372,7 @@
           <a:p>
             <a:fld id="{4509A250-FF31-4206-8172-F9D3106AACB1}" type="datetimeFigureOut">
               <a:rPr lang="en-US" dirty="0"/>
-              <a:t>4/2/2015</a:t>
+              <a:t>4/12/2015</a:t>
             </a:fld>
             <a:endParaRPr lang="en-US" dirty="0"/>
           </a:p>
@@ -1990,7 +1990,7 @@
           <a:p>
             <a:fld id="{4509A250-FF31-4206-8172-F9D3106AACB1}" type="datetimeFigureOut">
               <a:rPr lang="en-US" dirty="0"/>
-              <a:t>4/2/2015</a:t>
+              <a:t>4/12/2015</a:t>
             </a:fld>
             <a:endParaRPr lang="en-US" dirty="0"/>
           </a:p>
@@ -2845,7 +2845,7 @@
           <a:p>
             <a:fld id="{4509A250-FF31-4206-8172-F9D3106AACB1}" type="datetimeFigureOut">
               <a:rPr lang="en-US" dirty="0"/>
-              <a:t>4/2/2015</a:t>
+              <a:t>4/12/2015</a:t>
             </a:fld>
             <a:endParaRPr lang="en-US" dirty="0"/>
           </a:p>
@@ -3010,7 +3010,7 @@
           <a:p>
             <a:fld id="{4509A250-FF31-4206-8172-F9D3106AACB1}" type="datetimeFigureOut">
               <a:rPr lang="en-US" dirty="0"/>
-              <a:t>4/2/2015</a:t>
+              <a:t>4/12/2015</a:t>
             </a:fld>
             <a:endParaRPr lang="en-US" dirty="0"/>
           </a:p>
@@ -3185,7 +3185,7 @@
           <a:p>
             <a:fld id="{4509A250-FF31-4206-8172-F9D3106AACB1}" type="datetimeFigureOut">
               <a:rPr lang="en-US" dirty="0"/>
-              <a:t>4/2/2015</a:t>
+              <a:t>4/12/2015</a:t>
             </a:fld>
             <a:endParaRPr lang="en-US" dirty="0"/>
           </a:p>
@@ -3350,7 +3350,7 @@
           <a:p>
             <a:fld id="{4509A250-FF31-4206-8172-F9D3106AACB1}" type="datetimeFigureOut">
               <a:rPr lang="en-US" dirty="0"/>
-              <a:t>4/2/2015</a:t>
+              <a:t>4/12/2015</a:t>
             </a:fld>
             <a:endParaRPr lang="en-US" dirty="0"/>
           </a:p>
@@ -3592,7 +3592,7 @@
           <a:p>
             <a:fld id="{9796027F-7875-4030-9381-8BD8C4F21935}" type="datetimeFigureOut">
               <a:rPr lang="en-US" dirty="0"/>
-              <a:t>4/2/2015</a:t>
+              <a:t>4/12/2015</a:t>
             </a:fld>
             <a:endParaRPr lang="en-US" dirty="0"/>
           </a:p>
@@ -3879,7 +3879,7 @@
           <a:p>
             <a:fld id="{9796027F-7875-4030-9381-8BD8C4F21935}" type="datetimeFigureOut">
               <a:rPr lang="en-US" dirty="0"/>
-              <a:t>4/2/2015</a:t>
+              <a:t>4/12/2015</a:t>
             </a:fld>
             <a:endParaRPr lang="en-US" dirty="0"/>
           </a:p>
@@ -4318,7 +4318,7 @@
           <a:p>
             <a:fld id="{9796027F-7875-4030-9381-8BD8C4F21935}" type="datetimeFigureOut">
               <a:rPr lang="en-US" dirty="0"/>
-              <a:t>4/2/2015</a:t>
+              <a:t>4/12/2015</a:t>
             </a:fld>
             <a:endParaRPr lang="en-US" dirty="0"/>
           </a:p>
@@ -4431,7 +4431,7 @@
           <a:p>
             <a:fld id="{4509A250-FF31-4206-8172-F9D3106AACB1}" type="datetimeFigureOut">
               <a:rPr lang="en-US" dirty="0"/>
-              <a:t>4/2/2015</a:t>
+              <a:t>4/12/2015</a:t>
             </a:fld>
             <a:endParaRPr lang="en-US" dirty="0"/>
           </a:p>
@@ -4521,7 +4521,7 @@
           <a:p>
             <a:fld id="{4509A250-FF31-4206-8172-F9D3106AACB1}" type="datetimeFigureOut">
               <a:rPr lang="en-US" dirty="0"/>
-              <a:t>4/2/2015</a:t>
+              <a:t>4/12/2015</a:t>
             </a:fld>
             <a:endParaRPr lang="en-US" dirty="0"/>
           </a:p>
@@ -4795,7 +4795,7 @@
           <a:p>
             <a:fld id="{4509A250-FF31-4206-8172-F9D3106AACB1}" type="datetimeFigureOut">
               <a:rPr lang="en-US" dirty="0"/>
-              <a:t>4/2/2015</a:t>
+              <a:t>4/12/2015</a:t>
             </a:fld>
             <a:endParaRPr lang="en-US" dirty="0"/>
           </a:p>
@@ -5065,7 +5065,7 @@
           <a:p>
             <a:fld id="{4509A250-FF31-4206-8172-F9D3106AACB1}" type="datetimeFigureOut">
               <a:rPr lang="en-US" dirty="0"/>
-              <a:t>4/2/2015</a:t>
+              <a:t>4/12/2015</a:t>
             </a:fld>
             <a:endParaRPr lang="en-US" dirty="0"/>
           </a:p>
@@ -5489,7 +5489,7 @@
           <a:p>
             <a:fld id="{4AAD347D-5ACD-4C99-B74B-A9C85AD731AF}" type="datetimeFigureOut">
               <a:rPr lang="en-US" dirty="0"/>
-              <a:t>4/2/2015</a:t>
+              <a:t>4/12/2015</a:t>
             </a:fld>
             <a:endParaRPr lang="en-US" dirty="0"/>
           </a:p>
@@ -6013,6 +6013,36 @@
           <a:chExt cx="0" cy="0"/>
         </a:xfrm>
       </p:grpSpPr>
+      <p:pic>
+        <p:nvPicPr>
+          <p:cNvPr id="5" name="Picture 4"/>
+          <p:cNvPicPr>
+            <a:picLocks noChangeAspect="1"/>
+          </p:cNvPicPr>
+          <p:nvPr/>
+        </p:nvPicPr>
+        <p:blipFill>
+          <a:blip r:embed="rId2">
+            <a:extLst>
+              <a:ext uri="{28A0092B-C50C-407E-A947-70E740481C1C}">
+                <a14:useLocalDpi xmlns:a14="http://schemas.microsoft.com/office/drawing/2010/main" val="0"/>
+              </a:ext>
+            </a:extLst>
+          </a:blip>
+          <a:stretch>
+            <a:fillRect/>
+          </a:stretch>
+        </p:blipFill>
+        <p:spPr>
+          <a:xfrm>
+            <a:off x="4275787" y="616980"/>
+            <a:ext cx="7259172" cy="5305155"/>
+          </a:xfrm>
+          <a:prstGeom prst="rect">
+            <a:avLst/>
+          </a:prstGeom>
+        </p:spPr>
+      </p:pic>
       <p:sp>
         <p:nvSpPr>
           <p:cNvPr id="2" name="Title 1"/>
@@ -6023,7 +6053,12 @@
             <p:ph type="ctrTitle"/>
           </p:nvPr>
         </p:nvSpPr>
-        <p:spPr/>
+        <p:spPr>
+          <a:xfrm>
+            <a:off x="1154955" y="3580327"/>
+            <a:ext cx="8825658" cy="1197054"/>
+          </a:xfrm>
+        </p:spPr>
         <p:txBody>
           <a:bodyPr/>
           <a:lstStyle/>
@@ -6058,11 +6093,7 @@
           <a:p>
             <a:r>
               <a:rPr lang="en-US" dirty="0" smtClean="0"/>
-              <a:t>Group Members</a:t>
-            </a:r>
-            <a:r>
-              <a:rPr lang="en-US" dirty="0" smtClean="0"/>
-              <a:t>: Jason Nixon, Mohammad Sameeh, Guillermo Fabian </a:t>
+              <a:t>Group Members: Jason Nixon, Mohammad Sameeh, Guillermo Fabian </a:t>
             </a:r>
             <a:endParaRPr lang="en-US" dirty="0"/>
           </a:p>

</xml_diff>